<commit_message>
add empty RG highlight feature
</commit_message>
<xml_diff>
--- a/My Azure Extension.pptx
+++ b/My Azure Extension.pptx
@@ -8,8 +8,9 @@
     <p:sldId id="258" r:id="rId2"/>
     <p:sldId id="256" r:id="rId3"/>
     <p:sldId id="257" r:id="rId4"/>
-    <p:sldId id="259" r:id="rId5"/>
-    <p:sldId id="260" r:id="rId6"/>
+    <p:sldId id="260" r:id="rId5"/>
+    <p:sldId id="259" r:id="rId6"/>
+    <p:sldId id="261" r:id="rId7"/>
   </p:sldIdLst>
   <p:sldSz cx="12192000" cy="6858000"/>
   <p:notesSz cx="6858000" cy="9144000"/>
@@ -263,7 +264,7 @@
           <a:p>
             <a:fld id="{DD956615-4E69-4601-879E-C9C61DEA03B6}" type="datetimeFigureOut">
               <a:rPr lang="en-US" smtClean="0"/>
-              <a:t>12/26/2020</a:t>
+              <a:t>8/10/2023</a:t>
             </a:fld>
             <a:endParaRPr lang="en-US"/>
           </a:p>
@@ -461,7 +462,7 @@
           <a:p>
             <a:fld id="{DD956615-4E69-4601-879E-C9C61DEA03B6}" type="datetimeFigureOut">
               <a:rPr lang="en-US" smtClean="0"/>
-              <a:t>12/26/2020</a:t>
+              <a:t>8/10/2023</a:t>
             </a:fld>
             <a:endParaRPr lang="en-US"/>
           </a:p>
@@ -669,7 +670,7 @@
           <a:p>
             <a:fld id="{DD956615-4E69-4601-879E-C9C61DEA03B6}" type="datetimeFigureOut">
               <a:rPr lang="en-US" smtClean="0"/>
-              <a:t>12/26/2020</a:t>
+              <a:t>8/10/2023</a:t>
             </a:fld>
             <a:endParaRPr lang="en-US"/>
           </a:p>
@@ -867,7 +868,7 @@
           <a:p>
             <a:fld id="{DD956615-4E69-4601-879E-C9C61DEA03B6}" type="datetimeFigureOut">
               <a:rPr lang="en-US" smtClean="0"/>
-              <a:t>12/26/2020</a:t>
+              <a:t>8/10/2023</a:t>
             </a:fld>
             <a:endParaRPr lang="en-US"/>
           </a:p>
@@ -1142,7 +1143,7 @@
           <a:p>
             <a:fld id="{DD956615-4E69-4601-879E-C9C61DEA03B6}" type="datetimeFigureOut">
               <a:rPr lang="en-US" smtClean="0"/>
-              <a:t>12/26/2020</a:t>
+              <a:t>8/10/2023</a:t>
             </a:fld>
             <a:endParaRPr lang="en-US"/>
           </a:p>
@@ -1407,7 +1408,7 @@
           <a:p>
             <a:fld id="{DD956615-4E69-4601-879E-C9C61DEA03B6}" type="datetimeFigureOut">
               <a:rPr lang="en-US" smtClean="0"/>
-              <a:t>12/26/2020</a:t>
+              <a:t>8/10/2023</a:t>
             </a:fld>
             <a:endParaRPr lang="en-US"/>
           </a:p>
@@ -1819,7 +1820,7 @@
           <a:p>
             <a:fld id="{DD956615-4E69-4601-879E-C9C61DEA03B6}" type="datetimeFigureOut">
               <a:rPr lang="en-US" smtClean="0"/>
-              <a:t>12/26/2020</a:t>
+              <a:t>8/10/2023</a:t>
             </a:fld>
             <a:endParaRPr lang="en-US"/>
           </a:p>
@@ -1960,7 +1961,7 @@
           <a:p>
             <a:fld id="{DD956615-4E69-4601-879E-C9C61DEA03B6}" type="datetimeFigureOut">
               <a:rPr lang="en-US" smtClean="0"/>
-              <a:t>12/26/2020</a:t>
+              <a:t>8/10/2023</a:t>
             </a:fld>
             <a:endParaRPr lang="en-US"/>
           </a:p>
@@ -2073,7 +2074,7 @@
           <a:p>
             <a:fld id="{DD956615-4E69-4601-879E-C9C61DEA03B6}" type="datetimeFigureOut">
               <a:rPr lang="en-US" smtClean="0"/>
-              <a:t>12/26/2020</a:t>
+              <a:t>8/10/2023</a:t>
             </a:fld>
             <a:endParaRPr lang="en-US"/>
           </a:p>
@@ -2384,7 +2385,7 @@
           <a:p>
             <a:fld id="{DD956615-4E69-4601-879E-C9C61DEA03B6}" type="datetimeFigureOut">
               <a:rPr lang="en-US" smtClean="0"/>
-              <a:t>12/26/2020</a:t>
+              <a:t>8/10/2023</a:t>
             </a:fld>
             <a:endParaRPr lang="en-US"/>
           </a:p>
@@ -2672,7 +2673,7 @@
           <a:p>
             <a:fld id="{DD956615-4E69-4601-879E-C9C61DEA03B6}" type="datetimeFigureOut">
               <a:rPr lang="en-US" smtClean="0"/>
-              <a:t>12/26/2020</a:t>
+              <a:t>8/10/2023</a:t>
             </a:fld>
             <a:endParaRPr lang="en-US"/>
           </a:p>
@@ -2913,7 +2914,7 @@
           <a:p>
             <a:fld id="{DD956615-4E69-4601-879E-C9C61DEA03B6}" type="datetimeFigureOut">
               <a:rPr lang="en-US" smtClean="0"/>
-              <a:t>12/26/2020</a:t>
+              <a:t>8/10/2023</a:t>
             </a:fld>
             <a:endParaRPr lang="en-US"/>
           </a:p>
@@ -3883,36 +3884,6 @@
           <a:chExt cx="0" cy="0"/>
         </a:xfrm>
       </p:grpSpPr>
-    </p:spTree>
-    <p:extLst>
-      <p:ext uri="{BB962C8B-B14F-4D97-AF65-F5344CB8AC3E}">
-        <p14:creationId xmlns:p14="http://schemas.microsoft.com/office/powerpoint/2010/main" val="3555942452"/>
-      </p:ext>
-    </p:extLst>
-  </p:cSld>
-  <p:clrMapOvr>
-    <a:masterClrMapping/>
-  </p:clrMapOvr>
-</p:sld>
-</file>
-
-<file path=ppt/slides/slide5.xml><?xml version="1.0" encoding="utf-8"?>
-<p:sld xmlns:a="http://schemas.openxmlformats.org/drawingml/2006/main" xmlns:r="http://schemas.openxmlformats.org/officeDocument/2006/relationships" xmlns:p="http://schemas.openxmlformats.org/presentationml/2006/main">
-  <p:cSld>
-    <p:spTree>
-      <p:nvGrpSpPr>
-        <p:cNvPr id="1" name=""/>
-        <p:cNvGrpSpPr/>
-        <p:nvPr/>
-      </p:nvGrpSpPr>
-      <p:grpSpPr>
-        <a:xfrm>
-          <a:off x="0" y="0"/>
-          <a:ext cx="0" cy="0"/>
-          <a:chOff x="0" y="0"/>
-          <a:chExt cx="0" cy="0"/>
-        </a:xfrm>
-      </p:grpSpPr>
       <p:pic>
         <p:nvPicPr>
           <p:cNvPr id="11" name="Picture 10">
@@ -4188,6 +4159,282 @@
     <p:extLst>
       <p:ext uri="{BB962C8B-B14F-4D97-AF65-F5344CB8AC3E}">
         <p14:creationId xmlns:p14="http://schemas.microsoft.com/office/powerpoint/2010/main" val="2453888186"/>
+      </p:ext>
+    </p:extLst>
+  </p:cSld>
+  <p:clrMapOvr>
+    <a:masterClrMapping/>
+  </p:clrMapOvr>
+</p:sld>
+</file>
+
+<file path=ppt/slides/slide5.xml><?xml version="1.0" encoding="utf-8"?>
+<p:sld xmlns:a="http://schemas.openxmlformats.org/drawingml/2006/main" xmlns:r="http://schemas.openxmlformats.org/officeDocument/2006/relationships" xmlns:p="http://schemas.openxmlformats.org/presentationml/2006/main">
+  <p:cSld>
+    <p:spTree>
+      <p:nvGrpSpPr>
+        <p:cNvPr id="1" name=""/>
+        <p:cNvGrpSpPr/>
+        <p:nvPr/>
+      </p:nvGrpSpPr>
+      <p:grpSpPr>
+        <a:xfrm>
+          <a:off x="0" y="0"/>
+          <a:ext cx="0" cy="0"/>
+          <a:chOff x="0" y="0"/>
+          <a:chExt cx="0" cy="0"/>
+        </a:xfrm>
+      </p:grpSpPr>
+      <p:pic>
+        <p:nvPicPr>
+          <p:cNvPr id="5" name="Picture 4">
+            <a:extLst>
+              <a:ext uri="{FF2B5EF4-FFF2-40B4-BE49-F238E27FC236}">
+                <a16:creationId xmlns:a16="http://schemas.microsoft.com/office/drawing/2014/main" id="{AB1613B9-069B-DFB0-8D3E-0F52AA2D8DAB}"/>
+              </a:ext>
+            </a:extLst>
+          </p:cNvPr>
+          <p:cNvPicPr>
+            <a:picLocks noChangeAspect="1"/>
+          </p:cNvPicPr>
+          <p:nvPr/>
+        </p:nvPicPr>
+        <p:blipFill>
+          <a:blip r:embed="rId2"/>
+          <a:stretch>
+            <a:fillRect/>
+          </a:stretch>
+        </p:blipFill>
+        <p:spPr>
+          <a:xfrm>
+            <a:off x="2276475" y="185737"/>
+            <a:ext cx="7639050" cy="6486525"/>
+          </a:xfrm>
+          <a:prstGeom prst="rect">
+            <a:avLst/>
+          </a:prstGeom>
+        </p:spPr>
+      </p:pic>
+      <p:sp>
+        <p:nvSpPr>
+          <p:cNvPr id="6" name="Rectangle 5">
+            <a:extLst>
+              <a:ext uri="{FF2B5EF4-FFF2-40B4-BE49-F238E27FC236}">
+                <a16:creationId xmlns:a16="http://schemas.microsoft.com/office/drawing/2014/main" id="{6B9733BF-CA1F-3F6F-6D33-4CAAC202B920}"/>
+              </a:ext>
+            </a:extLst>
+          </p:cNvPr>
+          <p:cNvSpPr/>
+          <p:nvPr/>
+        </p:nvSpPr>
+        <p:spPr>
+          <a:xfrm>
+            <a:off x="7615327" y="51179"/>
+            <a:ext cx="886889" cy="914337"/>
+          </a:xfrm>
+          <a:prstGeom prst="rect">
+            <a:avLst/>
+          </a:prstGeom>
+          <a:noFill/>
+          <a:ln w="50800">
+            <a:solidFill>
+              <a:srgbClr val="FF0000"/>
+            </a:solidFill>
+          </a:ln>
+        </p:spPr>
+        <p:style>
+          <a:lnRef idx="2">
+            <a:schemeClr val="accent1">
+              <a:shade val="50000"/>
+            </a:schemeClr>
+          </a:lnRef>
+          <a:fillRef idx="1">
+            <a:schemeClr val="accent1"/>
+          </a:fillRef>
+          <a:effectRef idx="0">
+            <a:schemeClr val="accent1"/>
+          </a:effectRef>
+          <a:fontRef idx="minor">
+            <a:schemeClr val="lt1"/>
+          </a:fontRef>
+        </p:style>
+        <p:txBody>
+          <a:bodyPr rtlCol="0" anchor="ctr"/>
+          <a:lstStyle/>
+          <a:p>
+            <a:pPr algn="ctr"/>
+            <a:endParaRPr lang="en-US"/>
+          </a:p>
+        </p:txBody>
+      </p:sp>
+      <p:sp>
+        <p:nvSpPr>
+          <p:cNvPr id="7" name="Rectangle 6">
+            <a:extLst>
+              <a:ext uri="{FF2B5EF4-FFF2-40B4-BE49-F238E27FC236}">
+                <a16:creationId xmlns:a16="http://schemas.microsoft.com/office/drawing/2014/main" id="{259BC57D-EE86-1E1D-6703-FCDD09159298}"/>
+              </a:ext>
+            </a:extLst>
+          </p:cNvPr>
+          <p:cNvSpPr/>
+          <p:nvPr/>
+        </p:nvSpPr>
+        <p:spPr>
+          <a:xfrm>
+            <a:off x="2276475" y="4258744"/>
+            <a:ext cx="5998561" cy="914337"/>
+          </a:xfrm>
+          <a:prstGeom prst="rect">
+            <a:avLst/>
+          </a:prstGeom>
+          <a:noFill/>
+          <a:ln w="50800">
+            <a:solidFill>
+              <a:srgbClr val="FF0000"/>
+            </a:solidFill>
+          </a:ln>
+        </p:spPr>
+        <p:style>
+          <a:lnRef idx="2">
+            <a:schemeClr val="accent1">
+              <a:shade val="50000"/>
+            </a:schemeClr>
+          </a:lnRef>
+          <a:fillRef idx="1">
+            <a:schemeClr val="accent1"/>
+          </a:fillRef>
+          <a:effectRef idx="0">
+            <a:schemeClr val="accent1"/>
+          </a:effectRef>
+          <a:fontRef idx="minor">
+            <a:schemeClr val="lt1"/>
+          </a:fontRef>
+        </p:style>
+        <p:txBody>
+          <a:bodyPr rtlCol="0" anchor="ctr"/>
+          <a:lstStyle/>
+          <a:p>
+            <a:pPr algn="ctr"/>
+            <a:endParaRPr lang="en-US"/>
+          </a:p>
+        </p:txBody>
+      </p:sp>
+    </p:spTree>
+    <p:extLst>
+      <p:ext uri="{BB962C8B-B14F-4D97-AF65-F5344CB8AC3E}">
+        <p14:creationId xmlns:p14="http://schemas.microsoft.com/office/powerpoint/2010/main" val="3555942452"/>
+      </p:ext>
+    </p:extLst>
+  </p:cSld>
+  <p:clrMapOvr>
+    <a:masterClrMapping/>
+  </p:clrMapOvr>
+</p:sld>
+</file>
+
+<file path=ppt/slides/slide6.xml><?xml version="1.0" encoding="utf-8"?>
+<p:sld xmlns:a="http://schemas.openxmlformats.org/drawingml/2006/main" xmlns:r="http://schemas.openxmlformats.org/officeDocument/2006/relationships" xmlns:p="http://schemas.openxmlformats.org/presentationml/2006/main">
+  <p:cSld>
+    <p:spTree>
+      <p:nvGrpSpPr>
+        <p:cNvPr id="1" name=""/>
+        <p:cNvGrpSpPr/>
+        <p:nvPr/>
+      </p:nvGrpSpPr>
+      <p:grpSpPr>
+        <a:xfrm>
+          <a:off x="0" y="0"/>
+          <a:ext cx="0" cy="0"/>
+          <a:chOff x="0" y="0"/>
+          <a:chExt cx="0" cy="0"/>
+        </a:xfrm>
+      </p:grpSpPr>
+      <p:pic>
+        <p:nvPicPr>
+          <p:cNvPr id="5" name="Picture 4">
+            <a:extLst>
+              <a:ext uri="{FF2B5EF4-FFF2-40B4-BE49-F238E27FC236}">
+                <a16:creationId xmlns:a16="http://schemas.microsoft.com/office/drawing/2014/main" id="{A8A65ECA-FC08-7DD1-42A4-B24B60D7F337}"/>
+              </a:ext>
+            </a:extLst>
+          </p:cNvPr>
+          <p:cNvPicPr>
+            <a:picLocks noChangeAspect="1"/>
+          </p:cNvPicPr>
+          <p:nvPr/>
+        </p:nvPicPr>
+        <p:blipFill>
+          <a:blip r:embed="rId2"/>
+          <a:stretch>
+            <a:fillRect/>
+          </a:stretch>
+        </p:blipFill>
+        <p:spPr>
+          <a:xfrm>
+            <a:off x="1274325" y="0"/>
+            <a:ext cx="9643350" cy="6858000"/>
+          </a:xfrm>
+          <a:prstGeom prst="rect">
+            <a:avLst/>
+          </a:prstGeom>
+        </p:spPr>
+      </p:pic>
+      <p:sp>
+        <p:nvSpPr>
+          <p:cNvPr id="6" name="Rectangle 5">
+            <a:extLst>
+              <a:ext uri="{FF2B5EF4-FFF2-40B4-BE49-F238E27FC236}">
+                <a16:creationId xmlns:a16="http://schemas.microsoft.com/office/drawing/2014/main" id="{E17D5DDC-8135-B562-2C52-9C1DF203AFFC}"/>
+              </a:ext>
+            </a:extLst>
+          </p:cNvPr>
+          <p:cNvSpPr/>
+          <p:nvPr/>
+        </p:nvSpPr>
+        <p:spPr>
+          <a:xfrm>
+            <a:off x="1339357" y="3429000"/>
+            <a:ext cx="9428981" cy="944217"/>
+          </a:xfrm>
+          <a:prstGeom prst="rect">
+            <a:avLst/>
+          </a:prstGeom>
+          <a:noFill/>
+          <a:ln w="50800">
+            <a:solidFill>
+              <a:srgbClr val="FF0000"/>
+            </a:solidFill>
+          </a:ln>
+        </p:spPr>
+        <p:style>
+          <a:lnRef idx="2">
+            <a:schemeClr val="accent1">
+              <a:shade val="50000"/>
+            </a:schemeClr>
+          </a:lnRef>
+          <a:fillRef idx="1">
+            <a:schemeClr val="accent1"/>
+          </a:fillRef>
+          <a:effectRef idx="0">
+            <a:schemeClr val="accent1"/>
+          </a:effectRef>
+          <a:fontRef idx="minor">
+            <a:schemeClr val="lt1"/>
+          </a:fontRef>
+        </p:style>
+        <p:txBody>
+          <a:bodyPr rtlCol="0" anchor="ctr"/>
+          <a:lstStyle/>
+          <a:p>
+            <a:pPr algn="ctr"/>
+            <a:endParaRPr lang="en-US"/>
+          </a:p>
+        </p:txBody>
+      </p:sp>
+    </p:spTree>
+    <p:extLst>
+      <p:ext uri="{BB962C8B-B14F-4D97-AF65-F5344CB8AC3E}">
+        <p14:creationId xmlns:p14="http://schemas.microsoft.com/office/powerpoint/2010/main" val="1053115456"/>
       </p:ext>
     </p:extLst>
   </p:cSld>
@@ -4490,4 +4737,10 @@
     </a:ext>
   </a:extLst>
 </a:theme>
+</file>
+
+<file path=docMetadata/LabelInfo.xml><?xml version="1.0" encoding="utf-8"?>
+<clbl:labelList xmlns:clbl="http://schemas.microsoft.com/office/2020/mipLabelMetadata">
+  <clbl:label id="{f42aa342-8706-4288-bd11-ebb85995028c}" enabled="1" method="Standard" siteId="{72f988bf-86f1-41af-91ab-2d7cd011db47}" contentBits="0" removed="0"/>
+</clbl:labelList>
 </file>
</xml_diff>